<commit_message>
Updated Day 6 - Slides and Supporting Materials.
</commit_message>
<xml_diff>
--- a/Day 6/Slides/2. Configuring and Using CloudWatch for Advanced Workloads/configuring-and-using-cloudwatch-for-advanced-workloads-slides.pptx
+++ b/Day 6/Slides/2. Configuring and Using CloudWatch for Advanced Workloads/configuring-and-using-cloudwatch-for-advanced-workloads-slides.pptx
@@ -5,7 +5,7 @@
     <p:sldMasterId id="2147483648" r:id="rId1"/>
   </p:sldMasterIdLst>
   <p:notesMasterIdLst>
-    <p:notesMasterId r:id="rId19"/>
+    <p:notesMasterId r:id="rId21"/>
   </p:notesMasterIdLst>
   <p:sldIdLst>
     <p:sldId id="256" r:id="rId3"/>
@@ -23,7 +23,9 @@
     <p:sldId id="267" r:id="rId15"/>
     <p:sldId id="268" r:id="rId16"/>
     <p:sldId id="269" r:id="rId17"/>
-    <p:sldId id="272" r:id="rId18"/>
+    <p:sldId id="278" r:id="rId18"/>
+    <p:sldId id="279" r:id="rId19"/>
+    <p:sldId id="272" r:id="rId20"/>
   </p:sldIdLst>
   <p:sldSz cx="12192000" cy="6858000"/>
   <p:notesSz cx="12192000" cy="6858000"/>
@@ -4234,6 +4236,233 @@
         <p:cNvGrpSpPr/>
         <p:nvPr/>
       </p:nvGrpSpPr>
+      <p:grpSpPr/>
+      <p:sp>
+        <p:nvSpPr>
+          <p:cNvPr id="6" name="Title 5"/>
+          <p:cNvSpPr>
+            <a:spLocks noGrp="1"/>
+          </p:cNvSpPr>
+          <p:nvPr>
+            <p:ph type="title"/>
+          </p:nvPr>
+        </p:nvSpPr>
+        <p:spPr/>
+        <p:txBody>
+          <a:bodyPr/>
+          <a:p>
+            <a:endParaRPr lang="en-US"/>
+          </a:p>
+        </p:txBody>
+      </p:sp>
+      <p:sp>
+        <p:nvSpPr>
+          <p:cNvPr id="4" name="Slide Number Placeholder 3"/>
+          <p:cNvSpPr>
+            <a:spLocks noGrp="1"/>
+          </p:cNvSpPr>
+          <p:nvPr>
+            <p:ph type="sldNum" sz="quarter" idx="7"/>
+          </p:nvPr>
+        </p:nvSpPr>
+        <p:spPr/>
+        <p:txBody>
+          <a:bodyPr/>
+          <a:p>
+            <a:fld id="{B6F15528-21DE-4FAA-801E-634DDDAF4B2B}" type="slidenum">
+              <a:rPr/>
+            </a:fld>
+            <a:endParaRPr/>
+          </a:p>
+        </p:txBody>
+      </p:sp>
+      <p:sp>
+        <p:nvSpPr>
+          <p:cNvPr id="7" name="Content Placeholder 6"/>
+          <p:cNvSpPr>
+            <a:spLocks noGrp="1"/>
+          </p:cNvSpPr>
+          <p:nvPr>
+            <p:ph sz="half" idx="3"/>
+          </p:nvPr>
+        </p:nvSpPr>
+        <p:spPr/>
+        <p:txBody>
+          <a:bodyPr/>
+          <a:p>
+            <a:endParaRPr lang="en-US"/>
+          </a:p>
+        </p:txBody>
+      </p:sp>
+      <p:pic>
+        <p:nvPicPr>
+          <p:cNvPr id="5" name="Content Placeholder 4"/>
+          <p:cNvPicPr>
+            <a:picLocks noChangeAspect="1"/>
+          </p:cNvPicPr>
+          <p:nvPr>
+            <p:ph sz="half" idx="2"/>
+          </p:nvPr>
+        </p:nvPicPr>
+        <p:blipFill>
+          <a:blip r:embed="rId1"/>
+          <a:stretch>
+            <a:fillRect/>
+          </a:stretch>
+        </p:blipFill>
+        <p:spPr>
+          <a:xfrm>
+            <a:off x="212090" y="152400"/>
+            <a:ext cx="11799570" cy="6162675"/>
+          </a:xfrm>
+          <a:prstGeom prst="rect">
+            <a:avLst/>
+          </a:prstGeom>
+        </p:spPr>
+      </p:pic>
+    </p:spTree>
+  </p:cSld>
+  <p:clrMapOvr>
+    <a:masterClrMapping/>
+  </p:clrMapOvr>
+</p:sld>
+</file>
+
+<file path=ppt/slides/slide17.xml><?xml version="1.0" encoding="utf-8"?>
+<p:sld xmlns:a="http://schemas.openxmlformats.org/drawingml/2006/main" xmlns:r="http://schemas.openxmlformats.org/officeDocument/2006/relationships" xmlns:p="http://schemas.openxmlformats.org/presentationml/2006/main">
+  <p:cSld>
+    <p:spTree>
+      <p:nvGrpSpPr>
+        <p:cNvPr id="1" name=""/>
+        <p:cNvGrpSpPr/>
+        <p:nvPr/>
+      </p:nvGrpSpPr>
+      <p:grpSpPr/>
+      <p:sp>
+        <p:nvSpPr>
+          <p:cNvPr id="7" name="Title 6"/>
+          <p:cNvSpPr>
+            <a:spLocks noGrp="1"/>
+          </p:cNvSpPr>
+          <p:nvPr>
+            <p:ph type="title"/>
+          </p:nvPr>
+        </p:nvSpPr>
+        <p:spPr/>
+        <p:txBody>
+          <a:bodyPr/>
+          <a:p>
+            <a:endParaRPr lang="en-US"/>
+          </a:p>
+        </p:txBody>
+      </p:sp>
+      <p:sp>
+        <p:nvSpPr>
+          <p:cNvPr id="4" name="Slide Number Placeholder 3"/>
+          <p:cNvSpPr>
+            <a:spLocks noGrp="1"/>
+          </p:cNvSpPr>
+          <p:nvPr>
+            <p:ph type="sldNum" sz="quarter" idx="7"/>
+          </p:nvPr>
+        </p:nvSpPr>
+        <p:spPr/>
+        <p:txBody>
+          <a:bodyPr/>
+          <a:p>
+            <a:fld id="{B6F15528-21DE-4FAA-801E-634DDDAF4B2B}" type="slidenum">
+              <a:rPr/>
+            </a:fld>
+            <a:endParaRPr/>
+          </a:p>
+        </p:txBody>
+      </p:sp>
+      <p:sp>
+        <p:nvSpPr>
+          <p:cNvPr id="8" name="Content Placeholder 7"/>
+          <p:cNvSpPr>
+            <a:spLocks noGrp="1"/>
+          </p:cNvSpPr>
+          <p:nvPr>
+            <p:ph sz="half" idx="3"/>
+          </p:nvPr>
+        </p:nvSpPr>
+        <p:spPr/>
+        <p:txBody>
+          <a:bodyPr/>
+          <a:p>
+            <a:endParaRPr lang="en-US"/>
+          </a:p>
+        </p:txBody>
+      </p:sp>
+      <p:graphicFrame>
+        <p:nvGraphicFramePr>
+          <p:cNvPr id="5" name="Content Placeholder 4"/>
+          <p:cNvGraphicFramePr/>
+          <p:nvPr>
+            <p:ph sz="half" idx="2"/>
+          </p:nvPr>
+        </p:nvGraphicFramePr>
+        <p:xfrm>
+          <a:off x="152400" y="533400"/>
+          <a:ext cx="11902440" cy="5280660"/>
+        </p:xfrm>
+        <a:graphic>
+          <a:graphicData uri="http://schemas.openxmlformats.org/presentationml/2006/ole">
+            <mc:AlternateContent xmlns:mc="http://schemas.openxmlformats.org/markup-compatibility/2006">
+              <mc:Choice xmlns:v="urn:schemas-microsoft-com:vml" Requires="v">
+                <p:oleObj spid="_x0000_s6" name="" r:id="rId1" imgW="8810625" imgH="4543425" progId="Paint.Picture">
+                  <p:embed/>
+                </p:oleObj>
+              </mc:Choice>
+              <mc:Fallback>
+                <p:oleObj name="" r:id="rId1" imgW="8810625" imgH="4543425" progId="Paint.Picture">
+                  <p:embed/>
+                  <p:pic>
+                    <p:nvPicPr>
+                      <p:cNvPr id="0" name="Picture 5"/>
+                      <p:cNvPicPr/>
+                      <p:nvPr/>
+                    </p:nvPicPr>
+                    <p:blipFill>
+                      <a:blip r:embed="rId2"/>
+                      <a:stretch>
+                        <a:fillRect/>
+                      </a:stretch>
+                    </p:blipFill>
+                    <p:spPr>
+                      <a:xfrm>
+                        <a:off x="152400" y="533400"/>
+                        <a:ext cx="11902440" cy="5280660"/>
+                      </a:xfrm>
+                      <a:prstGeom prst="rect">
+                        <a:avLst/>
+                      </a:prstGeom>
+                    </p:spPr>
+                  </p:pic>
+                </p:oleObj>
+              </mc:Fallback>
+            </mc:AlternateContent>
+          </a:graphicData>
+        </a:graphic>
+      </p:graphicFrame>
+    </p:spTree>
+  </p:cSld>
+  <p:clrMapOvr>
+    <a:masterClrMapping/>
+  </p:clrMapOvr>
+</p:sld>
+</file>
+
+<file path=ppt/slides/slide18.xml><?xml version="1.0" encoding="utf-8"?>
+<p:sld xmlns:a="http://schemas.openxmlformats.org/drawingml/2006/main" xmlns:r="http://schemas.openxmlformats.org/officeDocument/2006/relationships" xmlns:p="http://schemas.openxmlformats.org/presentationml/2006/main">
+  <p:cSld>
+    <p:spTree>
+      <p:nvGrpSpPr>
+        <p:cNvPr id="1" name=""/>
+        <p:cNvGrpSpPr/>
+        <p:nvPr/>
+      </p:nvGrpSpPr>
       <p:grpSpPr>
         <a:xfrm>
           <a:off x="0" y="0"/>
@@ -4657,6 +4886,30 @@
           </a:p>
         </p:txBody>
       </p:sp>
+      <p:pic>
+        <p:nvPicPr>
+          <p:cNvPr id="8" name="Picture 7"/>
+          <p:cNvPicPr>
+            <a:picLocks noChangeAspect="1"/>
+          </p:cNvPicPr>
+          <p:nvPr/>
+        </p:nvPicPr>
+        <p:blipFill>
+          <a:blip r:embed="rId2"/>
+          <a:stretch>
+            <a:fillRect/>
+          </a:stretch>
+        </p:blipFill>
+        <p:spPr>
+          <a:xfrm>
+            <a:off x="4800600" y="4876800"/>
+            <a:ext cx="7428865" cy="728345"/>
+          </a:xfrm>
+          <a:prstGeom prst="rect">
+            <a:avLst/>
+          </a:prstGeom>
+        </p:spPr>
+      </p:pic>
     </p:spTree>
   </p:cSld>
   <p:clrMapOvr>

</xml_diff>